<commit_message>
step 4, 5, 6
</commit_message>
<xml_diff>
--- a/Spec.pptx
+++ b/Spec.pptx
@@ -5,16 +5,20 @@
     <p:sldMasterId id="2147483648" r:id="rId1"/>
   </p:sldMasterIdLst>
   <p:notesMasterIdLst>
-    <p:notesMasterId r:id="rId6"/>
+    <p:notesMasterId r:id="rId10"/>
   </p:notesMasterIdLst>
   <p:handoutMasterIdLst>
-    <p:handoutMasterId r:id="rId7"/>
+    <p:handoutMasterId r:id="rId11"/>
   </p:handoutMasterIdLst>
   <p:sldIdLst>
     <p:sldId id="393" r:id="rId2"/>
     <p:sldId id="396" r:id="rId3"/>
     <p:sldId id="394" r:id="rId4"/>
     <p:sldId id="395" r:id="rId5"/>
+    <p:sldId id="397" r:id="rId6"/>
+    <p:sldId id="398" r:id="rId7"/>
+    <p:sldId id="399" r:id="rId8"/>
+    <p:sldId id="400" r:id="rId9"/>
   </p:sldIdLst>
   <p:sldSz cx="9144000" cy="6858000" type="screen4x3"/>
   <p:notesSz cx="6858000" cy="9144000"/>
@@ -475,7 +479,7 @@
             <a:fld id="{DBBD8FC4-34A1-4233-A6BA-0F47C30FFA96}" type="datetimeFigureOut">
               <a:rPr lang="fr-FR" altLang="en-US"/>
               <a:pPr/>
-              <a:t>14/10/2013</a:t>
+              <a:t>24/10/2013</a:t>
             </a:fld>
             <a:endParaRPr lang="fr-FR" altLang="en-US"/>
           </a:p>
@@ -20089,6 +20093,1079 @@
     <p:extLst>
       <p:ext uri="{BB962C8B-B14F-4D97-AF65-F5344CB8AC3E}">
         <p14:creationId xmlns:p14="http://schemas.microsoft.com/office/powerpoint/2010/main" val="352318704"/>
+      </p:ext>
+    </p:extLst>
+  </p:cSld>
+  <p:clrMapOvr>
+    <a:masterClrMapping/>
+  </p:clrMapOvr>
+</p:sld>
+</file>
+
+<file path=ppt/slides/slide5.xml><?xml version="1.0" encoding="utf-8"?>
+<p:sld xmlns:a="http://schemas.openxmlformats.org/drawingml/2006/main" xmlns:r="http://schemas.openxmlformats.org/officeDocument/2006/relationships" xmlns:p="http://schemas.openxmlformats.org/presentationml/2006/main">
+  <p:cSld>
+    <p:spTree>
+      <p:nvGrpSpPr>
+        <p:cNvPr id="1" name=""/>
+        <p:cNvGrpSpPr/>
+        <p:nvPr/>
+      </p:nvGrpSpPr>
+      <p:grpSpPr>
+        <a:xfrm>
+          <a:off x="0" y="0"/>
+          <a:ext cx="0" cy="0"/>
+          <a:chOff x="0" y="0"/>
+          <a:chExt cx="0" cy="0"/>
+        </a:xfrm>
+      </p:grpSpPr>
+      <p:sp>
+        <p:nvSpPr>
+          <p:cNvPr id="2" name="Content Placeholder 1"/>
+          <p:cNvSpPr>
+            <a:spLocks noGrp="1"/>
+          </p:cNvSpPr>
+          <p:nvPr>
+            <p:ph idx="1"/>
+          </p:nvPr>
+        </p:nvSpPr>
+        <p:spPr/>
+        <p:txBody>
+          <a:bodyPr/>
+          <a:lstStyle/>
+          <a:p>
+            <a:r>
+              <a:rPr lang="fr-CA" dirty="0" smtClean="0"/>
+              <a:t>Soumettre le traitement sur un navigateur</a:t>
+            </a:r>
+          </a:p>
+          <a:p>
+            <a:r>
+              <a:rPr lang="fr-CA" dirty="0" smtClean="0"/>
+              <a:t>Récupérer le scrip</a:t>
+            </a:r>
+            <a:r>
+              <a:rPr lang="fr-CA" dirty="0" smtClean="0"/>
+              <a:t>t sur un autre navigateur et l’exécuter</a:t>
+            </a:r>
+            <a:endParaRPr lang="fr-CA" dirty="0" smtClean="0"/>
+          </a:p>
+        </p:txBody>
+      </p:sp>
+      <p:sp>
+        <p:nvSpPr>
+          <p:cNvPr id="3" name="Title 2"/>
+          <p:cNvSpPr>
+            <a:spLocks noGrp="1"/>
+          </p:cNvSpPr>
+          <p:nvPr>
+            <p:ph type="title"/>
+          </p:nvPr>
+        </p:nvSpPr>
+        <p:spPr/>
+        <p:txBody>
+          <a:bodyPr/>
+          <a:lstStyle/>
+          <a:p>
+            <a:r>
+              <a:rPr lang="fr-CA" dirty="0" err="1" smtClean="0"/>
+              <a:t>Step</a:t>
+            </a:r>
+            <a:r>
+              <a:rPr lang="fr-CA" dirty="0" smtClean="0"/>
+              <a:t> 3</a:t>
+            </a:r>
+            <a:endParaRPr lang="en-US" dirty="0"/>
+          </a:p>
+        </p:txBody>
+      </p:sp>
+    </p:spTree>
+    <p:extLst>
+      <p:ext uri="{BB962C8B-B14F-4D97-AF65-F5344CB8AC3E}">
+        <p14:creationId xmlns:p14="http://schemas.microsoft.com/office/powerpoint/2010/main" val="2254915239"/>
+      </p:ext>
+    </p:extLst>
+  </p:cSld>
+  <p:clrMapOvr>
+    <a:masterClrMapping/>
+  </p:clrMapOvr>
+</p:sld>
+</file>
+
+<file path=ppt/slides/slide6.xml><?xml version="1.0" encoding="utf-8"?>
+<p:sld xmlns:a="http://schemas.openxmlformats.org/drawingml/2006/main" xmlns:r="http://schemas.openxmlformats.org/officeDocument/2006/relationships" xmlns:p="http://schemas.openxmlformats.org/presentationml/2006/main">
+  <p:cSld>
+    <p:spTree>
+      <p:nvGrpSpPr>
+        <p:cNvPr id="1" name=""/>
+        <p:cNvGrpSpPr/>
+        <p:nvPr/>
+      </p:nvGrpSpPr>
+      <p:grpSpPr>
+        <a:xfrm>
+          <a:off x="0" y="0"/>
+          <a:ext cx="0" cy="0"/>
+          <a:chOff x="0" y="0"/>
+          <a:chExt cx="0" cy="0"/>
+        </a:xfrm>
+      </p:grpSpPr>
+      <p:sp>
+        <p:nvSpPr>
+          <p:cNvPr id="2" name="Content Placeholder 1"/>
+          <p:cNvSpPr>
+            <a:spLocks noGrp="1"/>
+          </p:cNvSpPr>
+          <p:nvPr>
+            <p:ph idx="1"/>
+          </p:nvPr>
+        </p:nvSpPr>
+        <p:spPr/>
+        <p:txBody>
+          <a:bodyPr/>
+          <a:lstStyle/>
+          <a:p>
+            <a:r>
+              <a:rPr lang="fr-CA" dirty="0" smtClean="0"/>
+              <a:t>Lorsque la page s’ouvre, le navigateur devient connu du serveur</a:t>
+            </a:r>
+          </a:p>
+          <a:p>
+            <a:r>
+              <a:rPr lang="fr-CA" dirty="0" smtClean="0"/>
+              <a:t>On soumet le traitement sur un navigateur</a:t>
+            </a:r>
+          </a:p>
+          <a:p>
+            <a:r>
+              <a:rPr lang="fr-CA" dirty="0" smtClean="0"/>
+              <a:t>Le traitement est transmis de façon transparente à un des navigateurs enregistrés</a:t>
+            </a:r>
+          </a:p>
+          <a:p>
+            <a:r>
+              <a:rPr lang="fr-CA" dirty="0" smtClean="0"/>
+              <a:t>C’est exécuté sur le navigateur</a:t>
+            </a:r>
+          </a:p>
+          <a:p>
+            <a:r>
+              <a:rPr lang="fr-CA" dirty="0" smtClean="0"/>
+              <a:t>La réponse est retransmise à l’appelant et afficher à l’écran (un </a:t>
+            </a:r>
+            <a:r>
+              <a:rPr lang="fr-CA" dirty="0" err="1" smtClean="0"/>
+              <a:t>alert</a:t>
+            </a:r>
+            <a:r>
+              <a:rPr lang="fr-CA" dirty="0" smtClean="0"/>
+              <a:t> est ok)</a:t>
+            </a:r>
+          </a:p>
+          <a:p>
+            <a:endParaRPr lang="fr-CA" dirty="0"/>
+          </a:p>
+          <a:p>
+            <a:r>
+              <a:rPr lang="fr-CA" b="1" dirty="0" smtClean="0"/>
+              <a:t>Note: </a:t>
+            </a:r>
+            <a:r>
+              <a:rPr lang="fr-CA" dirty="0" smtClean="0"/>
+              <a:t>Faire un </a:t>
+            </a:r>
+            <a:r>
+              <a:rPr lang="fr-CA" dirty="0" err="1" smtClean="0"/>
+              <a:t>eval</a:t>
+            </a:r>
+            <a:r>
+              <a:rPr lang="fr-CA" dirty="0" smtClean="0"/>
+              <a:t> tout basique me va très bien</a:t>
+            </a:r>
+          </a:p>
+        </p:txBody>
+      </p:sp>
+      <p:sp>
+        <p:nvSpPr>
+          <p:cNvPr id="3" name="Title 2"/>
+          <p:cNvSpPr>
+            <a:spLocks noGrp="1"/>
+          </p:cNvSpPr>
+          <p:nvPr>
+            <p:ph type="title"/>
+          </p:nvPr>
+        </p:nvSpPr>
+        <p:spPr/>
+        <p:txBody>
+          <a:bodyPr/>
+          <a:lstStyle/>
+          <a:p>
+            <a:r>
+              <a:rPr lang="fr-CA" dirty="0" err="1" smtClean="0"/>
+              <a:t>Step</a:t>
+            </a:r>
+            <a:r>
+              <a:rPr lang="fr-CA" dirty="0" smtClean="0"/>
+              <a:t> </a:t>
+            </a:r>
+            <a:r>
+              <a:rPr lang="fr-CA" dirty="0" smtClean="0"/>
+              <a:t>4</a:t>
+            </a:r>
+            <a:endParaRPr lang="en-US" dirty="0"/>
+          </a:p>
+        </p:txBody>
+      </p:sp>
+    </p:spTree>
+    <p:extLst>
+      <p:ext uri="{BB962C8B-B14F-4D97-AF65-F5344CB8AC3E}">
+        <p14:creationId xmlns:p14="http://schemas.microsoft.com/office/powerpoint/2010/main" val="1942548829"/>
+      </p:ext>
+    </p:extLst>
+  </p:cSld>
+  <p:clrMapOvr>
+    <a:masterClrMapping/>
+  </p:clrMapOvr>
+</p:sld>
+</file>
+
+<file path=ppt/slides/slide7.xml><?xml version="1.0" encoding="utf-8"?>
+<p:sld xmlns:a="http://schemas.openxmlformats.org/drawingml/2006/main" xmlns:r="http://schemas.openxmlformats.org/officeDocument/2006/relationships" xmlns:p="http://schemas.openxmlformats.org/presentationml/2006/main">
+  <p:cSld>
+    <p:spTree>
+      <p:nvGrpSpPr>
+        <p:cNvPr id="1" name=""/>
+        <p:cNvGrpSpPr/>
+        <p:nvPr/>
+      </p:nvGrpSpPr>
+      <p:grpSpPr>
+        <a:xfrm>
+          <a:off x="0" y="0"/>
+          <a:ext cx="0" cy="0"/>
+          <a:chOff x="0" y="0"/>
+          <a:chExt cx="0" cy="0"/>
+        </a:xfrm>
+      </p:grpSpPr>
+      <p:sp>
+        <p:nvSpPr>
+          <p:cNvPr id="2" name="Content Placeholder 1"/>
+          <p:cNvSpPr>
+            <a:spLocks noGrp="1"/>
+          </p:cNvSpPr>
+          <p:nvPr>
+            <p:ph idx="1"/>
+          </p:nvPr>
+        </p:nvSpPr>
+        <p:spPr/>
+        <p:txBody>
+          <a:bodyPr/>
+          <a:lstStyle/>
+          <a:p>
+            <a:r>
+              <a:rPr lang="fr-CA" dirty="0" smtClean="0"/>
+              <a:t>On envoie sur le serveur du code avec le format suivant</a:t>
+            </a:r>
+          </a:p>
+          <a:p>
+            <a:pPr marL="0" indent="0">
+              <a:buNone/>
+            </a:pPr>
+            <a:r>
+              <a:rPr lang="fr-CA" sz="1800" dirty="0" err="1">
+                <a:solidFill>
+                  <a:srgbClr val="000000"/>
+                </a:solidFill>
+                <a:latin typeface="Courier New"/>
+              </a:rPr>
+              <a:t>reduce</a:t>
+            </a:r>
+            <a:r>
+              <a:rPr lang="fr-CA" sz="1800" b="1" dirty="0">
+                <a:solidFill>
+                  <a:srgbClr val="000000"/>
+                </a:solidFill>
+                <a:latin typeface="Courier New"/>
+              </a:rPr>
+              <a:t>()</a:t>
+            </a:r>
+            <a:r>
+              <a:rPr lang="fr-CA" sz="1800" dirty="0">
+                <a:solidFill>
+                  <a:srgbClr val="000000"/>
+                </a:solidFill>
+                <a:latin typeface="Courier New"/>
+              </a:rPr>
+              <a:t> </a:t>
+            </a:r>
+            <a:r>
+              <a:rPr lang="fr-CA" sz="1800" b="1" dirty="0">
+                <a:solidFill>
+                  <a:srgbClr val="000000"/>
+                </a:solidFill>
+                <a:latin typeface="Courier New"/>
+              </a:rPr>
+              <a:t>{</a:t>
+            </a:r>
+            <a:r>
+              <a:rPr lang="fr-CA" sz="1800" dirty="0">
+                <a:solidFill>
+                  <a:srgbClr val="000000"/>
+                </a:solidFill>
+                <a:latin typeface="Courier New"/>
+              </a:rPr>
+              <a:t> </a:t>
+            </a:r>
+            <a:endParaRPr lang="fr-CA" sz="1800" dirty="0" smtClean="0">
+              <a:solidFill>
+                <a:srgbClr val="000000"/>
+              </a:solidFill>
+              <a:latin typeface="Courier New"/>
+            </a:endParaRPr>
+          </a:p>
+          <a:p>
+            <a:pPr marL="0" indent="0">
+              <a:buNone/>
+            </a:pPr>
+            <a:r>
+              <a:rPr lang="fr-CA" sz="1800" dirty="0">
+                <a:solidFill>
+                  <a:srgbClr val="000000"/>
+                </a:solidFill>
+                <a:latin typeface="Courier New"/>
+              </a:rPr>
+              <a:t> </a:t>
+            </a:r>
+            <a:r>
+              <a:rPr lang="fr-CA" sz="1800" dirty="0" smtClean="0">
+                <a:solidFill>
+                  <a:srgbClr val="000000"/>
+                </a:solidFill>
+                <a:latin typeface="Courier New"/>
+              </a:rPr>
+              <a:t> </a:t>
+            </a:r>
+            <a:r>
+              <a:rPr lang="fr-CA" sz="1800" dirty="0" smtClean="0">
+                <a:solidFill>
+                  <a:srgbClr val="008000"/>
+                </a:solidFill>
+                <a:latin typeface="Courier New"/>
+              </a:rPr>
+              <a:t>// </a:t>
+            </a:r>
+            <a:r>
+              <a:rPr lang="fr-CA" sz="1800" dirty="0">
+                <a:solidFill>
+                  <a:srgbClr val="008000"/>
+                </a:solidFill>
+                <a:latin typeface="Courier New"/>
+              </a:rPr>
+              <a:t>phase de réduction, on peut mettre ce qu'on </a:t>
+            </a:r>
+            <a:r>
+              <a:rPr lang="fr-CA" sz="1800" dirty="0" smtClean="0">
+                <a:solidFill>
+                  <a:srgbClr val="008000"/>
+                </a:solidFill>
+                <a:latin typeface="Courier New"/>
+              </a:rPr>
+              <a:t>veut</a:t>
+            </a:r>
+          </a:p>
+          <a:p>
+            <a:pPr marL="0" indent="0">
+              <a:buNone/>
+            </a:pPr>
+            <a:r>
+              <a:rPr lang="fr-CA" sz="1800" dirty="0">
+                <a:solidFill>
+                  <a:srgbClr val="008000"/>
+                </a:solidFill>
+                <a:latin typeface="Courier New"/>
+              </a:rPr>
+              <a:t> </a:t>
+            </a:r>
+            <a:r>
+              <a:rPr lang="fr-CA" sz="1800" dirty="0" smtClean="0">
+                <a:solidFill>
+                  <a:srgbClr val="008000"/>
+                </a:solidFill>
+                <a:latin typeface="Courier New"/>
+              </a:rPr>
+              <a:t> // </a:t>
+            </a:r>
+            <a:r>
+              <a:rPr lang="fr-CA" sz="1800" dirty="0">
+                <a:solidFill>
+                  <a:srgbClr val="008000"/>
+                </a:solidFill>
+                <a:latin typeface="Courier New"/>
+              </a:rPr>
+              <a:t>dedans en </a:t>
+            </a:r>
+            <a:r>
+              <a:rPr lang="fr-CA" sz="1800" dirty="0" smtClean="0">
+                <a:solidFill>
+                  <a:srgbClr val="008000"/>
+                </a:solidFill>
+                <a:latin typeface="Courier New"/>
+              </a:rPr>
+              <a:t>autant </a:t>
+            </a:r>
+            <a:r>
+              <a:rPr lang="fr-CA" sz="1800" dirty="0">
+                <a:solidFill>
+                  <a:srgbClr val="008000"/>
+                </a:solidFill>
+                <a:latin typeface="Courier New"/>
+              </a:rPr>
+              <a:t>que ça appelle des </a:t>
+            </a:r>
+            <a:r>
+              <a:rPr lang="fr-CA" sz="1800" dirty="0" err="1">
+                <a:solidFill>
+                  <a:srgbClr val="008000"/>
+                </a:solidFill>
+                <a:latin typeface="Courier New"/>
+              </a:rPr>
+              <a:t>map</a:t>
+            </a:r>
+            <a:r>
+              <a:rPr lang="fr-CA" sz="1800" dirty="0">
+                <a:solidFill>
+                  <a:srgbClr val="008000"/>
+                </a:solidFill>
+                <a:latin typeface="Courier New"/>
+              </a:rPr>
+              <a:t> </a:t>
+            </a:r>
+            <a:endParaRPr lang="fr-CA" sz="1800" dirty="0" smtClean="0">
+              <a:solidFill>
+                <a:srgbClr val="008000"/>
+              </a:solidFill>
+              <a:latin typeface="Courier New"/>
+            </a:endParaRPr>
+          </a:p>
+          <a:p>
+            <a:pPr marL="0" indent="0">
+              <a:buNone/>
+            </a:pPr>
+            <a:r>
+              <a:rPr lang="fr-CA" sz="1800" b="1" i="1" dirty="0">
+                <a:solidFill>
+                  <a:srgbClr val="008000"/>
+                </a:solidFill>
+                <a:latin typeface="Courier New"/>
+              </a:rPr>
+              <a:t> </a:t>
+            </a:r>
+            <a:r>
+              <a:rPr lang="fr-CA" sz="1800" b="1" i="1" dirty="0" smtClean="0">
+                <a:solidFill>
+                  <a:srgbClr val="008000"/>
+                </a:solidFill>
+                <a:latin typeface="Courier New"/>
+              </a:rPr>
+              <a:t> </a:t>
+            </a:r>
+            <a:r>
+              <a:rPr lang="fr-CA" sz="1800" b="1" i="1" dirty="0" smtClean="0">
+                <a:solidFill>
+                  <a:srgbClr val="000080"/>
+                </a:solidFill>
+                <a:latin typeface="Courier New"/>
+              </a:rPr>
+              <a:t>return</a:t>
+            </a:r>
+            <a:r>
+              <a:rPr lang="fr-CA" sz="1800" dirty="0" smtClean="0">
+                <a:solidFill>
+                  <a:srgbClr val="000000"/>
+                </a:solidFill>
+                <a:latin typeface="Courier New"/>
+              </a:rPr>
+              <a:t> </a:t>
+            </a:r>
+          </a:p>
+          <a:p>
+            <a:pPr marL="0" indent="0">
+              <a:buNone/>
+            </a:pPr>
+            <a:r>
+              <a:rPr lang="fr-CA" sz="1800" dirty="0">
+                <a:solidFill>
+                  <a:srgbClr val="000000"/>
+                </a:solidFill>
+                <a:latin typeface="Courier New"/>
+              </a:rPr>
+              <a:t> </a:t>
+            </a:r>
+            <a:r>
+              <a:rPr lang="fr-CA" sz="1800" dirty="0" smtClean="0">
+                <a:solidFill>
+                  <a:srgbClr val="000000"/>
+                </a:solidFill>
+                <a:latin typeface="Courier New"/>
+              </a:rPr>
+              <a:t>   </a:t>
+            </a:r>
+            <a:r>
+              <a:rPr lang="fr-CA" sz="1800" dirty="0" err="1" smtClean="0">
+                <a:solidFill>
+                  <a:srgbClr val="000000"/>
+                </a:solidFill>
+                <a:latin typeface="Courier New"/>
+              </a:rPr>
+              <a:t>map</a:t>
+            </a:r>
+            <a:r>
+              <a:rPr lang="fr-CA" sz="1800" b="1" dirty="0">
+                <a:solidFill>
+                  <a:srgbClr val="000000"/>
+                </a:solidFill>
+                <a:latin typeface="Courier New"/>
+              </a:rPr>
+              <a:t>()</a:t>
+            </a:r>
+            <a:r>
+              <a:rPr lang="fr-CA" sz="1800" dirty="0">
+                <a:solidFill>
+                  <a:srgbClr val="000000"/>
+                </a:solidFill>
+                <a:latin typeface="Courier New"/>
+              </a:rPr>
+              <a:t> </a:t>
+            </a:r>
+            <a:r>
+              <a:rPr lang="fr-CA" sz="1800" b="1" dirty="0">
+                <a:solidFill>
+                  <a:srgbClr val="000000"/>
+                </a:solidFill>
+                <a:latin typeface="Courier New"/>
+              </a:rPr>
+              <a:t>{</a:t>
+            </a:r>
+            <a:r>
+              <a:rPr lang="fr-CA" sz="1800" dirty="0">
+                <a:solidFill>
+                  <a:srgbClr val="000000"/>
+                </a:solidFill>
+                <a:latin typeface="Courier New"/>
+              </a:rPr>
+              <a:t> </a:t>
+            </a:r>
+            <a:r>
+              <a:rPr lang="fr-CA" sz="1800" b="1" i="1" dirty="0">
+                <a:solidFill>
+                  <a:srgbClr val="000080"/>
+                </a:solidFill>
+                <a:latin typeface="Courier New"/>
+              </a:rPr>
+              <a:t>return</a:t>
+            </a:r>
+            <a:r>
+              <a:rPr lang="fr-CA" sz="1800" dirty="0">
+                <a:solidFill>
+                  <a:srgbClr val="000000"/>
+                </a:solidFill>
+                <a:latin typeface="Courier New"/>
+              </a:rPr>
+              <a:t> </a:t>
+            </a:r>
+            <a:r>
+              <a:rPr lang="fr-CA" sz="1800" dirty="0" smtClean="0">
+                <a:solidFill>
+                  <a:srgbClr val="FF0000"/>
+                </a:solidFill>
+                <a:latin typeface="Courier New"/>
+              </a:rPr>
+              <a:t>1</a:t>
+            </a:r>
+            <a:r>
+              <a:rPr lang="fr-CA" sz="1800" b="1" dirty="0">
+                <a:solidFill>
+                  <a:srgbClr val="000000"/>
+                </a:solidFill>
+                <a:latin typeface="Courier New"/>
+              </a:rPr>
+              <a:t> </a:t>
+            </a:r>
+            <a:r>
+              <a:rPr lang="fr-CA" sz="1800" b="1" dirty="0" smtClean="0">
+                <a:solidFill>
+                  <a:srgbClr val="000000"/>
+                </a:solidFill>
+                <a:latin typeface="Courier New"/>
+              </a:rPr>
+              <a:t>} </a:t>
+            </a:r>
+            <a:r>
+              <a:rPr lang="fr-CA" sz="1800" dirty="0">
+                <a:solidFill>
+                  <a:srgbClr val="008000"/>
+                </a:solidFill>
+                <a:latin typeface="Courier New"/>
+              </a:rPr>
+              <a:t>// le traitement</a:t>
+            </a:r>
+            <a:r>
+              <a:rPr lang="fr-CA" sz="1800" dirty="0" smtClean="0">
+                <a:solidFill>
+                  <a:srgbClr val="000000"/>
+                </a:solidFill>
+                <a:latin typeface="Courier New"/>
+              </a:rPr>
+              <a:t> </a:t>
+            </a:r>
+          </a:p>
+          <a:p>
+            <a:pPr marL="0" indent="0">
+              <a:buNone/>
+            </a:pPr>
+            <a:r>
+              <a:rPr lang="fr-CA" sz="1800" b="1" dirty="0">
+                <a:solidFill>
+                  <a:srgbClr val="000000"/>
+                </a:solidFill>
+                <a:latin typeface="Courier New"/>
+              </a:rPr>
+              <a:t> </a:t>
+            </a:r>
+            <a:r>
+              <a:rPr lang="fr-CA" sz="1800" b="1" dirty="0" smtClean="0">
+                <a:solidFill>
+                  <a:srgbClr val="000000"/>
+                </a:solidFill>
+                <a:latin typeface="Courier New"/>
+              </a:rPr>
+              <a:t>   +</a:t>
+            </a:r>
+            <a:r>
+              <a:rPr lang="fr-CA" sz="1800" dirty="0" smtClean="0">
+                <a:solidFill>
+                  <a:srgbClr val="000000"/>
+                </a:solidFill>
+                <a:latin typeface="Courier New"/>
+              </a:rPr>
+              <a:t> </a:t>
+            </a:r>
+            <a:r>
+              <a:rPr lang="fr-CA" sz="1800" dirty="0">
+                <a:solidFill>
+                  <a:srgbClr val="008000"/>
+                </a:solidFill>
+                <a:latin typeface="Courier New"/>
+              </a:rPr>
+              <a:t>// exemple d'opération </a:t>
+            </a:r>
+            <a:endParaRPr lang="fr-CA" sz="1800" dirty="0" smtClean="0">
+              <a:solidFill>
+                <a:srgbClr val="008000"/>
+              </a:solidFill>
+              <a:latin typeface="Courier New"/>
+            </a:endParaRPr>
+          </a:p>
+          <a:p>
+            <a:pPr marL="0" indent="0">
+              <a:buNone/>
+            </a:pPr>
+            <a:r>
+              <a:rPr lang="fr-CA" sz="1800" dirty="0">
+                <a:solidFill>
+                  <a:srgbClr val="008000"/>
+                </a:solidFill>
+                <a:latin typeface="Courier New"/>
+              </a:rPr>
+              <a:t> </a:t>
+            </a:r>
+            <a:r>
+              <a:rPr lang="fr-CA" sz="1800" dirty="0" smtClean="0">
+                <a:solidFill>
+                  <a:srgbClr val="008000"/>
+                </a:solidFill>
+                <a:latin typeface="Courier New"/>
+              </a:rPr>
+              <a:t>   </a:t>
+            </a:r>
+            <a:r>
+              <a:rPr lang="fr-CA" sz="1800" dirty="0" err="1" smtClean="0">
+                <a:solidFill>
+                  <a:srgbClr val="000000"/>
+                </a:solidFill>
+                <a:latin typeface="Courier New"/>
+              </a:rPr>
+              <a:t>map</a:t>
+            </a:r>
+            <a:r>
+              <a:rPr lang="fr-CA" sz="1800" b="1" dirty="0">
+                <a:solidFill>
+                  <a:srgbClr val="000000"/>
+                </a:solidFill>
+                <a:latin typeface="Courier New"/>
+              </a:rPr>
+              <a:t>()</a:t>
+            </a:r>
+            <a:r>
+              <a:rPr lang="fr-CA" sz="1800" dirty="0">
+                <a:solidFill>
+                  <a:srgbClr val="000000"/>
+                </a:solidFill>
+                <a:latin typeface="Courier New"/>
+              </a:rPr>
+              <a:t> </a:t>
+            </a:r>
+            <a:r>
+              <a:rPr lang="fr-CA" sz="1800" b="1" dirty="0">
+                <a:solidFill>
+                  <a:srgbClr val="000000"/>
+                </a:solidFill>
+                <a:latin typeface="Courier New"/>
+              </a:rPr>
+              <a:t>{</a:t>
+            </a:r>
+            <a:r>
+              <a:rPr lang="fr-CA" sz="1800" dirty="0">
+                <a:solidFill>
+                  <a:srgbClr val="000000"/>
+                </a:solidFill>
+                <a:latin typeface="Courier New"/>
+              </a:rPr>
+              <a:t> </a:t>
+            </a:r>
+            <a:r>
+              <a:rPr lang="fr-CA" sz="1800" b="1" i="1" dirty="0">
+                <a:solidFill>
+                  <a:srgbClr val="000080"/>
+                </a:solidFill>
+                <a:latin typeface="Courier New"/>
+              </a:rPr>
+              <a:t>return</a:t>
+            </a:r>
+            <a:r>
+              <a:rPr lang="fr-CA" sz="1800" dirty="0">
+                <a:solidFill>
+                  <a:srgbClr val="000000"/>
+                </a:solidFill>
+                <a:latin typeface="Courier New"/>
+              </a:rPr>
+              <a:t> </a:t>
+            </a:r>
+            <a:r>
+              <a:rPr lang="fr-CA" sz="1800" dirty="0" smtClean="0">
+                <a:solidFill>
+                  <a:srgbClr val="FF0000"/>
+                </a:solidFill>
+                <a:latin typeface="Courier New"/>
+              </a:rPr>
+              <a:t>2</a:t>
+            </a:r>
+            <a:r>
+              <a:rPr lang="fr-CA" sz="1800" b="1" dirty="0">
+                <a:solidFill>
+                  <a:srgbClr val="000000"/>
+                </a:solidFill>
+                <a:latin typeface="Courier New"/>
+              </a:rPr>
+              <a:t> </a:t>
+            </a:r>
+            <a:r>
+              <a:rPr lang="fr-CA" sz="1800" b="1" dirty="0" smtClean="0">
+                <a:solidFill>
+                  <a:srgbClr val="000000"/>
+                </a:solidFill>
+                <a:latin typeface="Courier New"/>
+              </a:rPr>
+              <a:t>} </a:t>
+            </a:r>
+            <a:r>
+              <a:rPr lang="fr-CA" sz="1800" dirty="0">
+                <a:solidFill>
+                  <a:srgbClr val="008000"/>
+                </a:solidFill>
+                <a:latin typeface="Courier New"/>
+              </a:rPr>
+              <a:t>// l'autre bout du </a:t>
+            </a:r>
+            <a:r>
+              <a:rPr lang="fr-CA" sz="1800" dirty="0" smtClean="0">
+                <a:solidFill>
+                  <a:srgbClr val="008000"/>
+                </a:solidFill>
+                <a:latin typeface="Courier New"/>
+              </a:rPr>
+              <a:t>traitement</a:t>
+            </a:r>
+          </a:p>
+          <a:p>
+            <a:pPr marL="0" indent="0">
+              <a:buNone/>
+            </a:pPr>
+            <a:r>
+              <a:rPr lang="fr-CA" sz="1800" b="1" dirty="0" smtClean="0">
+                <a:solidFill>
+                  <a:srgbClr val="000000"/>
+                </a:solidFill>
+                <a:latin typeface="Courier New"/>
+              </a:rPr>
+              <a:t>}</a:t>
+            </a:r>
+            <a:endParaRPr lang="fr-CA" sz="1800" dirty="0" smtClean="0"/>
+          </a:p>
+          <a:p>
+            <a:r>
+              <a:rPr lang="fr-CA" dirty="0" smtClean="0"/>
+              <a:t>Chaque contenu d’un </a:t>
+            </a:r>
+            <a:r>
+              <a:rPr lang="fr-CA" dirty="0" err="1" smtClean="0">
+                <a:latin typeface="Courier New" panose="02070309020205020404" pitchFamily="49" charset="0"/>
+                <a:cs typeface="Courier New" panose="02070309020205020404" pitchFamily="49" charset="0"/>
+              </a:rPr>
+              <a:t>map</a:t>
+            </a:r>
+            <a:r>
+              <a:rPr lang="fr-CA" dirty="0" smtClean="0"/>
+              <a:t> est envoyé sur un navigateur</a:t>
+            </a:r>
+          </a:p>
+          <a:p>
+            <a:r>
+              <a:rPr lang="fr-CA" dirty="0" smtClean="0"/>
+              <a:t>Le navigateur exécute l’opération et retourne la réponse au serveur</a:t>
+            </a:r>
+          </a:p>
+          <a:p>
+            <a:r>
+              <a:rPr lang="fr-CA" dirty="0" smtClean="0"/>
+              <a:t>Le serveur attend toutes les réponses et appelle </a:t>
+            </a:r>
+            <a:r>
+              <a:rPr lang="fr-CA" dirty="0" err="1" smtClean="0">
+                <a:latin typeface="Courier New" panose="02070309020205020404" pitchFamily="49" charset="0"/>
+                <a:cs typeface="Courier New" panose="02070309020205020404" pitchFamily="49" charset="0"/>
+              </a:rPr>
+              <a:t>reduce</a:t>
+            </a:r>
+            <a:r>
+              <a:rPr lang="fr-CA" dirty="0" smtClean="0"/>
+              <a:t> pour les fusionner</a:t>
+            </a:r>
+          </a:p>
+          <a:p>
+            <a:r>
+              <a:rPr lang="fr-CA" dirty="0" smtClean="0"/>
+              <a:t>Il retourne la réponse au client qui l’affiche (</a:t>
+            </a:r>
+            <a:r>
+              <a:rPr lang="fr-CA" dirty="0" err="1" smtClean="0"/>
+              <a:t>alert</a:t>
+            </a:r>
+            <a:r>
+              <a:rPr lang="fr-CA" dirty="0" smtClean="0"/>
+              <a:t>)</a:t>
+            </a:r>
+            <a:endParaRPr lang="fr-CA" dirty="0"/>
+          </a:p>
+        </p:txBody>
+      </p:sp>
+      <p:sp>
+        <p:nvSpPr>
+          <p:cNvPr id="3" name="Title 2"/>
+          <p:cNvSpPr>
+            <a:spLocks noGrp="1"/>
+          </p:cNvSpPr>
+          <p:nvPr>
+            <p:ph type="title"/>
+          </p:nvPr>
+        </p:nvSpPr>
+        <p:spPr/>
+        <p:txBody>
+          <a:bodyPr/>
+          <a:lstStyle/>
+          <a:p>
+            <a:r>
+              <a:rPr lang="fr-CA" dirty="0" err="1" smtClean="0"/>
+              <a:t>Step</a:t>
+            </a:r>
+            <a:r>
+              <a:rPr lang="fr-CA" dirty="0" smtClean="0"/>
+              <a:t> 5</a:t>
+            </a:r>
+            <a:endParaRPr lang="en-US" dirty="0"/>
+          </a:p>
+        </p:txBody>
+      </p:sp>
+    </p:spTree>
+    <p:extLst>
+      <p:ext uri="{BB962C8B-B14F-4D97-AF65-F5344CB8AC3E}">
+        <p14:creationId xmlns:p14="http://schemas.microsoft.com/office/powerpoint/2010/main" val="4245867506"/>
+      </p:ext>
+    </p:extLst>
+  </p:cSld>
+  <p:clrMapOvr>
+    <a:masterClrMapping/>
+  </p:clrMapOvr>
+</p:sld>
+</file>
+
+<file path=ppt/slides/slide8.xml><?xml version="1.0" encoding="utf-8"?>
+<p:sld xmlns:a="http://schemas.openxmlformats.org/drawingml/2006/main" xmlns:r="http://schemas.openxmlformats.org/officeDocument/2006/relationships" xmlns:p="http://schemas.openxmlformats.org/presentationml/2006/main">
+  <p:cSld>
+    <p:spTree>
+      <p:nvGrpSpPr>
+        <p:cNvPr id="1" name=""/>
+        <p:cNvGrpSpPr/>
+        <p:nvPr/>
+      </p:nvGrpSpPr>
+      <p:grpSpPr>
+        <a:xfrm>
+          <a:off x="0" y="0"/>
+          <a:ext cx="0" cy="0"/>
+          <a:chOff x="0" y="0"/>
+          <a:chExt cx="0" cy="0"/>
+        </a:xfrm>
+      </p:grpSpPr>
+      <p:sp>
+        <p:nvSpPr>
+          <p:cNvPr id="2" name="Content Placeholder 1"/>
+          <p:cNvSpPr>
+            <a:spLocks noGrp="1"/>
+          </p:cNvSpPr>
+          <p:nvPr>
+            <p:ph idx="1"/>
+          </p:nvPr>
+        </p:nvSpPr>
+        <p:spPr/>
+        <p:txBody>
+          <a:bodyPr/>
+          <a:lstStyle/>
+          <a:p>
+            <a:r>
+              <a:rPr lang="fr-CA" dirty="0" smtClean="0"/>
+              <a:t>On fait du beau</a:t>
+            </a:r>
+          </a:p>
+          <a:p>
+            <a:endParaRPr lang="fr-CA" dirty="0"/>
+          </a:p>
+          <a:p>
+            <a:r>
+              <a:rPr lang="fr-CA" dirty="0" smtClean="0"/>
+              <a:t>Jolie </a:t>
+            </a:r>
+            <a:r>
+              <a:rPr lang="fr-CA" dirty="0" err="1" smtClean="0"/>
+              <a:t>twitter</a:t>
+            </a:r>
+            <a:r>
+              <a:rPr lang="fr-CA" dirty="0" smtClean="0"/>
+              <a:t> </a:t>
+            </a:r>
+            <a:r>
+              <a:rPr lang="fr-CA" dirty="0" err="1" smtClean="0"/>
+              <a:t>bootstrap</a:t>
+            </a:r>
+            <a:r>
+              <a:rPr lang="fr-CA" dirty="0" smtClean="0"/>
+              <a:t> avec </a:t>
+            </a:r>
+            <a:r>
+              <a:rPr lang="fr-CA" dirty="0" err="1" smtClean="0"/>
+              <a:t>GridJS</a:t>
+            </a:r>
+            <a:r>
+              <a:rPr lang="fr-CA" dirty="0" smtClean="0"/>
+              <a:t> en haut</a:t>
+            </a:r>
+          </a:p>
+          <a:p>
+            <a:r>
+              <a:rPr lang="fr-CA" dirty="0" smtClean="0"/>
+              <a:t>Une </a:t>
+            </a:r>
+            <a:r>
+              <a:rPr lang="fr-CA" dirty="0" err="1" smtClean="0"/>
+              <a:t>text</a:t>
+            </a:r>
+            <a:r>
+              <a:rPr lang="fr-CA" dirty="0" smtClean="0"/>
+              <a:t> area pour soumettre le code</a:t>
+            </a:r>
+          </a:p>
+          <a:p>
+            <a:r>
+              <a:rPr lang="fr-CA" dirty="0" smtClean="0"/>
+              <a:t>Lorsque le code est soumis, une </a:t>
+            </a:r>
+            <a:r>
+              <a:rPr lang="fr-CA" dirty="0" err="1" smtClean="0"/>
+              <a:t>progress</a:t>
+            </a:r>
+            <a:r>
+              <a:rPr lang="fr-CA" dirty="0" smtClean="0"/>
+              <a:t> bar apparaît</a:t>
+            </a:r>
+          </a:p>
+          <a:p>
+            <a:pPr lvl="1"/>
+            <a:r>
+              <a:rPr lang="fr-CA" dirty="0" smtClean="0"/>
+              <a:t>Elle indique le nombre de nœud où la demande a été transmise</a:t>
+            </a:r>
+          </a:p>
+          <a:p>
+            <a:pPr lvl="1"/>
+            <a:r>
+              <a:rPr lang="fr-CA" dirty="0" smtClean="0"/>
+              <a:t>Chaque fois qu’un nœud répond, la </a:t>
+            </a:r>
+            <a:r>
+              <a:rPr lang="fr-CA" dirty="0" err="1" smtClean="0"/>
+              <a:t>progress</a:t>
+            </a:r>
+            <a:r>
+              <a:rPr lang="fr-CA" dirty="0" smtClean="0"/>
+              <a:t> bar se remplit</a:t>
+            </a:r>
+          </a:p>
+          <a:p>
+            <a:r>
+              <a:rPr lang="fr-CA" dirty="0" smtClean="0"/>
+              <a:t>À la fin, la réponse au problème est afficher à l’écran (jolie champ et non une alerte)</a:t>
+            </a:r>
+          </a:p>
+        </p:txBody>
+      </p:sp>
+      <p:sp>
+        <p:nvSpPr>
+          <p:cNvPr id="3" name="Title 2"/>
+          <p:cNvSpPr>
+            <a:spLocks noGrp="1"/>
+          </p:cNvSpPr>
+          <p:nvPr>
+            <p:ph type="title"/>
+          </p:nvPr>
+        </p:nvSpPr>
+        <p:spPr/>
+        <p:txBody>
+          <a:bodyPr/>
+          <a:lstStyle/>
+          <a:p>
+            <a:r>
+              <a:rPr lang="fr-CA" dirty="0" err="1" smtClean="0"/>
+              <a:t>Step</a:t>
+            </a:r>
+            <a:r>
+              <a:rPr lang="fr-CA" dirty="0" smtClean="0"/>
+              <a:t> 6</a:t>
+            </a:r>
+            <a:endParaRPr lang="en-US" dirty="0"/>
+          </a:p>
+        </p:txBody>
+      </p:sp>
+    </p:spTree>
+    <p:extLst>
+      <p:ext uri="{BB962C8B-B14F-4D97-AF65-F5344CB8AC3E}">
+        <p14:creationId xmlns:p14="http://schemas.microsoft.com/office/powerpoint/2010/main" val="2909275890"/>
       </p:ext>
     </p:extLst>
   </p:cSld>

</xml_diff>